<commit_message>
updated presentation, removed old logoutput
</commit_message>
<xml_diff>
--- a/Presentation LabChat.pptx
+++ b/Presentation LabChat.pptx
@@ -268,7 +268,7 @@
           <a:p>
             <a:fld id="{10327095-FF13-41BF-8DF7-B30206B1C1FD}" type="datetimeFigureOut">
               <a:rPr lang="de-DE" smtClean="0"/>
-              <a:t>23.10.2018</a:t>
+              <a:t>25.10.2018</a:t>
             </a:fld>
             <a:endParaRPr lang="de-DE"/>
           </a:p>
@@ -466,7 +466,7 @@
           <a:p>
             <a:fld id="{10327095-FF13-41BF-8DF7-B30206B1C1FD}" type="datetimeFigureOut">
               <a:rPr lang="de-DE" smtClean="0"/>
-              <a:t>23.10.2018</a:t>
+              <a:t>25.10.2018</a:t>
             </a:fld>
             <a:endParaRPr lang="de-DE"/>
           </a:p>
@@ -674,7 +674,7 @@
           <a:p>
             <a:fld id="{10327095-FF13-41BF-8DF7-B30206B1C1FD}" type="datetimeFigureOut">
               <a:rPr lang="de-DE" smtClean="0"/>
-              <a:t>23.10.2018</a:t>
+              <a:t>25.10.2018</a:t>
             </a:fld>
             <a:endParaRPr lang="de-DE"/>
           </a:p>
@@ -872,7 +872,7 @@
           <a:p>
             <a:fld id="{10327095-FF13-41BF-8DF7-B30206B1C1FD}" type="datetimeFigureOut">
               <a:rPr lang="de-DE" smtClean="0"/>
-              <a:t>23.10.2018</a:t>
+              <a:t>25.10.2018</a:t>
             </a:fld>
             <a:endParaRPr lang="de-DE"/>
           </a:p>
@@ -1147,7 +1147,7 @@
           <a:p>
             <a:fld id="{10327095-FF13-41BF-8DF7-B30206B1C1FD}" type="datetimeFigureOut">
               <a:rPr lang="de-DE" smtClean="0"/>
-              <a:t>23.10.2018</a:t>
+              <a:t>25.10.2018</a:t>
             </a:fld>
             <a:endParaRPr lang="de-DE"/>
           </a:p>
@@ -1412,7 +1412,7 @@
           <a:p>
             <a:fld id="{10327095-FF13-41BF-8DF7-B30206B1C1FD}" type="datetimeFigureOut">
               <a:rPr lang="de-DE" smtClean="0"/>
-              <a:t>23.10.2018</a:t>
+              <a:t>25.10.2018</a:t>
             </a:fld>
             <a:endParaRPr lang="de-DE"/>
           </a:p>
@@ -1824,7 +1824,7 @@
           <a:p>
             <a:fld id="{10327095-FF13-41BF-8DF7-B30206B1C1FD}" type="datetimeFigureOut">
               <a:rPr lang="de-DE" smtClean="0"/>
-              <a:t>23.10.2018</a:t>
+              <a:t>25.10.2018</a:t>
             </a:fld>
             <a:endParaRPr lang="de-DE"/>
           </a:p>
@@ -1965,7 +1965,7 @@
           <a:p>
             <a:fld id="{10327095-FF13-41BF-8DF7-B30206B1C1FD}" type="datetimeFigureOut">
               <a:rPr lang="de-DE" smtClean="0"/>
-              <a:t>23.10.2018</a:t>
+              <a:t>25.10.2018</a:t>
             </a:fld>
             <a:endParaRPr lang="de-DE"/>
           </a:p>
@@ -2078,7 +2078,7 @@
           <a:p>
             <a:fld id="{10327095-FF13-41BF-8DF7-B30206B1C1FD}" type="datetimeFigureOut">
               <a:rPr lang="de-DE" smtClean="0"/>
-              <a:t>23.10.2018</a:t>
+              <a:t>25.10.2018</a:t>
             </a:fld>
             <a:endParaRPr lang="de-DE"/>
           </a:p>
@@ -2389,7 +2389,7 @@
           <a:p>
             <a:fld id="{10327095-FF13-41BF-8DF7-B30206B1C1FD}" type="datetimeFigureOut">
               <a:rPr lang="de-DE" smtClean="0"/>
-              <a:t>23.10.2018</a:t>
+              <a:t>25.10.2018</a:t>
             </a:fld>
             <a:endParaRPr lang="de-DE"/>
           </a:p>
@@ -2677,7 +2677,7 @@
           <a:p>
             <a:fld id="{10327095-FF13-41BF-8DF7-B30206B1C1FD}" type="datetimeFigureOut">
               <a:rPr lang="de-DE" smtClean="0"/>
-              <a:t>23.10.2018</a:t>
+              <a:t>25.10.2018</a:t>
             </a:fld>
             <a:endParaRPr lang="de-DE"/>
           </a:p>
@@ -2918,7 +2918,7 @@
           <a:p>
             <a:fld id="{10327095-FF13-41BF-8DF7-B30206B1C1FD}" type="datetimeFigureOut">
               <a:rPr lang="de-DE" smtClean="0"/>
-              <a:t>23.10.2018</a:t>
+              <a:t>25.10.2018</a:t>
             </a:fld>
             <a:endParaRPr lang="de-DE"/>
           </a:p>
@@ -4094,10 +4094,10 @@
       </p:sp>
       <p:pic>
         <p:nvPicPr>
-          <p:cNvPr id="10" name="Grafik 9">
-            <a:extLst>
-              <a:ext uri="{FF2B5EF4-FFF2-40B4-BE49-F238E27FC236}">
-                <a16:creationId xmlns:a16="http://schemas.microsoft.com/office/drawing/2014/main" id="{55F184AA-1107-4019-844C-A5992CF17A9B}"/>
+          <p:cNvPr id="6" name="Grafik 5">
+            <a:extLst>
+              <a:ext uri="{FF2B5EF4-FFF2-40B4-BE49-F238E27FC236}">
+                <a16:creationId xmlns:a16="http://schemas.microsoft.com/office/drawing/2014/main" id="{2047B876-1AE7-4E62-A0C1-5E7D3F1A964B}"/>
               </a:ext>
             </a:extLst>
           </p:cNvPr>
@@ -4120,8 +4120,8 @@
         </p:blipFill>
         <p:spPr>
           <a:xfrm>
-            <a:off x="944433" y="1166663"/>
-            <a:ext cx="10303133" cy="4797206"/>
+            <a:off x="1910676" y="1030397"/>
+            <a:ext cx="8147726" cy="5185738"/>
           </a:xfrm>
           <a:prstGeom prst="rect">
             <a:avLst/>

</xml_diff>